<commit_message>
update diagrams for UG & PPP
</commit_message>
<xml_diff>
--- a/docs/diagrams/UndoRedoExecuteUndoStateListDiagram.pptx
+++ b/docs/diagrams/UndoRedoExecuteUndoStateListDiagram.pptx
@@ -277,7 +277,7 @@
           <a:p>
             <a:fld id="{03EC4E3E-8101-482F-A883-8B55DAFF7C07}" type="datetimeFigureOut">
               <a:rPr lang="en-SG" smtClean="0"/>
-              <a:t>26/3/2019</a:t>
+              <a:t>5/4/2019</a:t>
             </a:fld>
             <a:endParaRPr lang="en-SG"/>
           </a:p>
@@ -477,7 +477,7 @@
           <a:p>
             <a:fld id="{03EC4E3E-8101-482F-A883-8B55DAFF7C07}" type="datetimeFigureOut">
               <a:rPr lang="en-SG" smtClean="0"/>
-              <a:t>26/3/2019</a:t>
+              <a:t>5/4/2019</a:t>
             </a:fld>
             <a:endParaRPr lang="en-SG"/>
           </a:p>
@@ -687,7 +687,7 @@
           <a:p>
             <a:fld id="{03EC4E3E-8101-482F-A883-8B55DAFF7C07}" type="datetimeFigureOut">
               <a:rPr lang="en-SG" smtClean="0"/>
-              <a:t>26/3/2019</a:t>
+              <a:t>5/4/2019</a:t>
             </a:fld>
             <a:endParaRPr lang="en-SG"/>
           </a:p>
@@ -887,7 +887,7 @@
           <a:p>
             <a:fld id="{03EC4E3E-8101-482F-A883-8B55DAFF7C07}" type="datetimeFigureOut">
               <a:rPr lang="en-SG" smtClean="0"/>
-              <a:t>26/3/2019</a:t>
+              <a:t>5/4/2019</a:t>
             </a:fld>
             <a:endParaRPr lang="en-SG"/>
           </a:p>
@@ -1163,7 +1163,7 @@
           <a:p>
             <a:fld id="{03EC4E3E-8101-482F-A883-8B55DAFF7C07}" type="datetimeFigureOut">
               <a:rPr lang="en-SG" smtClean="0"/>
-              <a:t>26/3/2019</a:t>
+              <a:t>5/4/2019</a:t>
             </a:fld>
             <a:endParaRPr lang="en-SG"/>
           </a:p>
@@ -1431,7 +1431,7 @@
           <a:p>
             <a:fld id="{03EC4E3E-8101-482F-A883-8B55DAFF7C07}" type="datetimeFigureOut">
               <a:rPr lang="en-SG" smtClean="0"/>
-              <a:t>26/3/2019</a:t>
+              <a:t>5/4/2019</a:t>
             </a:fld>
             <a:endParaRPr lang="en-SG"/>
           </a:p>
@@ -1846,7 +1846,7 @@
           <a:p>
             <a:fld id="{03EC4E3E-8101-482F-A883-8B55DAFF7C07}" type="datetimeFigureOut">
               <a:rPr lang="en-SG" smtClean="0"/>
-              <a:t>26/3/2019</a:t>
+              <a:t>5/4/2019</a:t>
             </a:fld>
             <a:endParaRPr lang="en-SG"/>
           </a:p>
@@ -1988,7 +1988,7 @@
           <a:p>
             <a:fld id="{03EC4E3E-8101-482F-A883-8B55DAFF7C07}" type="datetimeFigureOut">
               <a:rPr lang="en-SG" smtClean="0"/>
-              <a:t>26/3/2019</a:t>
+              <a:t>5/4/2019</a:t>
             </a:fld>
             <a:endParaRPr lang="en-SG"/>
           </a:p>
@@ -2101,7 +2101,7 @@
           <a:p>
             <a:fld id="{03EC4E3E-8101-482F-A883-8B55DAFF7C07}" type="datetimeFigureOut">
               <a:rPr lang="en-SG" smtClean="0"/>
-              <a:t>26/3/2019</a:t>
+              <a:t>5/4/2019</a:t>
             </a:fld>
             <a:endParaRPr lang="en-SG"/>
           </a:p>
@@ -2414,7 +2414,7 @@
           <a:p>
             <a:fld id="{03EC4E3E-8101-482F-A883-8B55DAFF7C07}" type="datetimeFigureOut">
               <a:rPr lang="en-SG" smtClean="0"/>
-              <a:t>26/3/2019</a:t>
+              <a:t>5/4/2019</a:t>
             </a:fld>
             <a:endParaRPr lang="en-SG"/>
           </a:p>
@@ -2703,7 +2703,7 @@
           <a:p>
             <a:fld id="{03EC4E3E-8101-482F-A883-8B55DAFF7C07}" type="datetimeFigureOut">
               <a:rPr lang="en-SG" smtClean="0"/>
-              <a:t>26/3/2019</a:t>
+              <a:t>5/4/2019</a:t>
             </a:fld>
             <a:endParaRPr lang="en-SG"/>
           </a:p>
@@ -2946,7 +2946,7 @@
           <a:p>
             <a:fld id="{03EC4E3E-8101-482F-A883-8B55DAFF7C07}" type="datetimeFigureOut">
               <a:rPr lang="en-SG" smtClean="0"/>
-              <a:t>26/3/2019</a:t>
+              <a:t>5/4/2019</a:t>
             </a:fld>
             <a:endParaRPr lang="en-SG"/>
           </a:p>
@@ -5869,7 +5869,7 @@
         <p:spPr>
           <a:xfrm>
             <a:off x="5246440" y="152928"/>
-            <a:ext cx="1736181" cy="400110"/>
+            <a:ext cx="2003882" cy="400110"/>
           </a:xfrm>
           <a:prstGeom prst="rect">
             <a:avLst/>
@@ -5884,7 +5884,7 @@
           <a:p>
             <a:r>
               <a:rPr lang="en-SG" sz="2000" b="1" u="sng" dirty="0" err="1"/>
-              <a:t>VersionProject</a:t>
+              <a:t>VersionedProject</a:t>
             </a:r>
             <a:endParaRPr lang="en-SG" sz="2000" b="1" u="sng" dirty="0"/>
           </a:p>
@@ -5980,50 +5980,6 @@
           </a:p>
         </p:txBody>
       </p:sp>
-      <p:cxnSp>
-        <p:nvCxnSpPr>
-          <p:cNvPr id="45" name="Straight Arrow Connector 44">
-            <a:extLst>
-              <a:ext uri="{FF2B5EF4-FFF2-40B4-BE49-F238E27FC236}">
-                <a16:creationId xmlns:a16="http://schemas.microsoft.com/office/drawing/2014/main" id="{B3742E7B-649B-4913-BF2F-095EA21DAF09}"/>
-              </a:ext>
-            </a:extLst>
-          </p:cNvPr>
-          <p:cNvCxnSpPr>
-            <a:cxnSpLocks/>
-          </p:cNvCxnSpPr>
-          <p:nvPr/>
-        </p:nvCxnSpPr>
-        <p:spPr>
-          <a:xfrm flipH="1" flipV="1">
-            <a:off x="10288971" y="5248178"/>
-            <a:ext cx="397988" cy="1"/>
-          </a:xfrm>
-          <a:prstGeom prst="straightConnector1">
-            <a:avLst/>
-          </a:prstGeom>
-          <a:ln w="28575">
-            <a:solidFill>
-              <a:srgbClr val="FF0000"/>
-            </a:solidFill>
-            <a:tailEnd type="triangle"/>
-          </a:ln>
-        </p:spPr>
-        <p:style>
-          <a:lnRef idx="1">
-            <a:schemeClr val="accent1"/>
-          </a:lnRef>
-          <a:fillRef idx="0">
-            <a:schemeClr val="accent1"/>
-          </a:fillRef>
-          <a:effectRef idx="0">
-            <a:schemeClr val="accent1"/>
-          </a:effectRef>
-          <a:fontRef idx="minor">
-            <a:schemeClr val="tx1"/>
-          </a:fontRef>
-        </p:style>
-      </p:cxnSp>
       <p:sp>
         <p:nvSpPr>
           <p:cNvPr id="24" name="Rectangle 23">
@@ -6562,6 +6518,282 @@
             <a:r>
               <a:rPr lang="en-SG" dirty="0"/>
               <a:t>Index* 3</a:t>
+            </a:r>
+          </a:p>
+        </p:txBody>
+      </p:sp>
+      <p:cxnSp>
+        <p:nvCxnSpPr>
+          <p:cNvPr id="3" name="Straight Arrow Connector 2">
+            <a:extLst>
+              <a:ext uri="{FF2B5EF4-FFF2-40B4-BE49-F238E27FC236}">
+                <a16:creationId xmlns:a16="http://schemas.microsoft.com/office/drawing/2014/main" id="{FEDAA816-B149-4BD9-B0F8-0B98C2DADF25}"/>
+              </a:ext>
+            </a:extLst>
+          </p:cNvPr>
+          <p:cNvCxnSpPr>
+            <a:stCxn id="42" idx="1"/>
+          </p:cNvCxnSpPr>
+          <p:nvPr/>
+        </p:nvCxnSpPr>
+        <p:spPr>
+          <a:xfrm flipH="1" flipV="1">
+            <a:off x="2297292" y="346229"/>
+            <a:ext cx="2949148" cy="6754"/>
+          </a:xfrm>
+          <a:prstGeom prst="straightConnector1">
+            <a:avLst/>
+          </a:prstGeom>
+          <a:ln w="38100">
+            <a:solidFill>
+              <a:schemeClr val="tx1"/>
+            </a:solidFill>
+            <a:tailEnd type="triangle"/>
+          </a:ln>
+        </p:spPr>
+        <p:style>
+          <a:lnRef idx="1">
+            <a:schemeClr val="accent1"/>
+          </a:lnRef>
+          <a:fillRef idx="0">
+            <a:schemeClr val="accent1"/>
+          </a:fillRef>
+          <a:effectRef idx="0">
+            <a:schemeClr val="accent1"/>
+          </a:effectRef>
+          <a:fontRef idx="minor">
+            <a:schemeClr val="tx1"/>
+          </a:fontRef>
+        </p:style>
+      </p:cxnSp>
+      <p:cxnSp>
+        <p:nvCxnSpPr>
+          <p:cNvPr id="7" name="Straight Arrow Connector 6">
+            <a:extLst>
+              <a:ext uri="{FF2B5EF4-FFF2-40B4-BE49-F238E27FC236}">
+                <a16:creationId xmlns:a16="http://schemas.microsoft.com/office/drawing/2014/main" id="{5A48656C-E850-4E7F-9999-29D22B053C12}"/>
+              </a:ext>
+            </a:extLst>
+          </p:cNvPr>
+          <p:cNvCxnSpPr>
+            <a:stCxn id="42" idx="3"/>
+          </p:cNvCxnSpPr>
+          <p:nvPr/>
+        </p:nvCxnSpPr>
+        <p:spPr>
+          <a:xfrm>
+            <a:off x="7250322" y="352983"/>
+            <a:ext cx="2977761" cy="2124"/>
+          </a:xfrm>
+          <a:prstGeom prst="straightConnector1">
+            <a:avLst/>
+          </a:prstGeom>
+          <a:ln w="38100">
+            <a:solidFill>
+              <a:schemeClr val="tx1"/>
+            </a:solidFill>
+            <a:tailEnd type="triangle"/>
+          </a:ln>
+        </p:spPr>
+        <p:style>
+          <a:lnRef idx="1">
+            <a:schemeClr val="accent1"/>
+          </a:lnRef>
+          <a:fillRef idx="0">
+            <a:schemeClr val="accent1"/>
+          </a:fillRef>
+          <a:effectRef idx="0">
+            <a:schemeClr val="accent1"/>
+          </a:effectRef>
+          <a:fontRef idx="minor">
+            <a:schemeClr val="tx1"/>
+          </a:fontRef>
+        </p:style>
+      </p:cxnSp>
+      <p:cxnSp>
+        <p:nvCxnSpPr>
+          <p:cNvPr id="46" name="Straight Arrow Connector 45">
+            <a:extLst>
+              <a:ext uri="{FF2B5EF4-FFF2-40B4-BE49-F238E27FC236}">
+                <a16:creationId xmlns:a16="http://schemas.microsoft.com/office/drawing/2014/main" id="{02E5C279-5352-4BFA-AB9E-9FBE67EDE11B}"/>
+              </a:ext>
+            </a:extLst>
+          </p:cNvPr>
+          <p:cNvCxnSpPr>
+            <a:cxnSpLocks/>
+          </p:cNvCxnSpPr>
+          <p:nvPr/>
+        </p:nvCxnSpPr>
+        <p:spPr>
+          <a:xfrm flipH="1" flipV="1">
+            <a:off x="10288970" y="766436"/>
+            <a:ext cx="446488" cy="1"/>
+          </a:xfrm>
+          <a:prstGeom prst="straightConnector1">
+            <a:avLst/>
+          </a:prstGeom>
+          <a:ln w="28575">
+            <a:solidFill>
+              <a:srgbClr val="FF9900"/>
+            </a:solidFill>
+            <a:tailEnd type="triangle"/>
+          </a:ln>
+        </p:spPr>
+        <p:style>
+          <a:lnRef idx="1">
+            <a:schemeClr val="accent1"/>
+          </a:lnRef>
+          <a:fillRef idx="0">
+            <a:schemeClr val="accent1"/>
+          </a:fillRef>
+          <a:effectRef idx="0">
+            <a:schemeClr val="accent1"/>
+          </a:effectRef>
+          <a:fontRef idx="minor">
+            <a:schemeClr val="tx1"/>
+          </a:fontRef>
+        </p:style>
+      </p:cxnSp>
+      <p:sp>
+        <p:nvSpPr>
+          <p:cNvPr id="49" name="Rectangle 48">
+            <a:extLst>
+              <a:ext uri="{FF2B5EF4-FFF2-40B4-BE49-F238E27FC236}">
+                <a16:creationId xmlns:a16="http://schemas.microsoft.com/office/drawing/2014/main" id="{981BB281-F00E-4F58-A8A4-AE993C387272}"/>
+              </a:ext>
+            </a:extLst>
+          </p:cNvPr>
+          <p:cNvSpPr/>
+          <p:nvPr/>
+        </p:nvSpPr>
+        <p:spPr>
+          <a:xfrm>
+            <a:off x="8216735" y="566892"/>
+            <a:ext cx="2072235" cy="5500230"/>
+          </a:xfrm>
+          <a:prstGeom prst="rect">
+            <a:avLst/>
+          </a:prstGeom>
+          <a:noFill/>
+          <a:ln w="57150">
+            <a:solidFill>
+              <a:srgbClr val="FF9900"/>
+            </a:solidFill>
+          </a:ln>
+        </p:spPr>
+        <p:style>
+          <a:lnRef idx="2">
+            <a:schemeClr val="accent1">
+              <a:shade val="50000"/>
+            </a:schemeClr>
+          </a:lnRef>
+          <a:fillRef idx="1">
+            <a:schemeClr val="accent1"/>
+          </a:fillRef>
+          <a:effectRef idx="0">
+            <a:schemeClr val="accent1"/>
+          </a:effectRef>
+          <a:fontRef idx="minor">
+            <a:schemeClr val="lt1"/>
+          </a:fontRef>
+        </p:style>
+        <p:txBody>
+          <a:bodyPr rtlCol="0" anchor="ctr"/>
+          <a:lstStyle/>
+          <a:p>
+            <a:pPr algn="ctr"/>
+            <a:endParaRPr lang="en-SG"/>
+          </a:p>
+        </p:txBody>
+      </p:sp>
+      <p:cxnSp>
+        <p:nvCxnSpPr>
+          <p:cNvPr id="45" name="Straight Arrow Connector 44">
+            <a:extLst>
+              <a:ext uri="{FF2B5EF4-FFF2-40B4-BE49-F238E27FC236}">
+                <a16:creationId xmlns:a16="http://schemas.microsoft.com/office/drawing/2014/main" id="{B3742E7B-649B-4913-BF2F-095EA21DAF09}"/>
+              </a:ext>
+            </a:extLst>
+          </p:cNvPr>
+          <p:cNvCxnSpPr>
+            <a:cxnSpLocks/>
+            <a:endCxn id="43" idx="3"/>
+          </p:cNvCxnSpPr>
+          <p:nvPr/>
+        </p:nvCxnSpPr>
+        <p:spPr>
+          <a:xfrm flipH="1" flipV="1">
+            <a:off x="10135322" y="5215452"/>
+            <a:ext cx="551638" cy="32728"/>
+          </a:xfrm>
+          <a:prstGeom prst="straightConnector1">
+            <a:avLst/>
+          </a:prstGeom>
+          <a:ln w="28575">
+            <a:solidFill>
+              <a:srgbClr val="FF0000"/>
+            </a:solidFill>
+            <a:tailEnd type="triangle"/>
+          </a:ln>
+        </p:spPr>
+        <p:style>
+          <a:lnRef idx="1">
+            <a:schemeClr val="accent1"/>
+          </a:lnRef>
+          <a:fillRef idx="0">
+            <a:schemeClr val="accent1"/>
+          </a:fillRef>
+          <a:effectRef idx="0">
+            <a:schemeClr val="accent1"/>
+          </a:effectRef>
+          <a:fontRef idx="minor">
+            <a:schemeClr val="tx1"/>
+          </a:fontRef>
+        </p:style>
+      </p:cxnSp>
+      <p:sp>
+        <p:nvSpPr>
+          <p:cNvPr id="50" name="TextBox 49">
+            <a:extLst>
+              <a:ext uri="{FF2B5EF4-FFF2-40B4-BE49-F238E27FC236}">
+                <a16:creationId xmlns:a16="http://schemas.microsoft.com/office/drawing/2014/main" id="{4B5C4045-E9EE-4FA5-B7C7-062BC571F065}"/>
+              </a:ext>
+            </a:extLst>
+          </p:cNvPr>
+          <p:cNvSpPr txBox="1"/>
+          <p:nvPr/>
+        </p:nvSpPr>
+        <p:spPr>
+          <a:xfrm>
+            <a:off x="10590684" y="275821"/>
+            <a:ext cx="2202038" cy="1200329"/>
+          </a:xfrm>
+          <a:prstGeom prst="rect">
+            <a:avLst/>
+          </a:prstGeom>
+          <a:noFill/>
+        </p:spPr>
+        <p:txBody>
+          <a:bodyPr wrap="square" rtlCol="0">
+            <a:spAutoFit/>
+          </a:bodyPr>
+          <a:lstStyle/>
+          <a:p>
+            <a:pPr algn="ctr"/>
+            <a:r>
+              <a:rPr lang="en-SG" dirty="0">
+                <a:latin typeface="Consolas" panose="020B0609020204030204" pitchFamily="49" charset="0"/>
+              </a:rPr>
+              <a:t>The </a:t>
+            </a:r>
+          </a:p>
+          <a:p>
+            <a:pPr algn="ctr"/>
+            <a:r>
+              <a:rPr lang="en-SG" dirty="0">
+                <a:latin typeface="Consolas" panose="020B0609020204030204" pitchFamily="49" charset="0"/>
+              </a:rPr>
+              <a:t>latest/current version of the project</a:t>
             </a:r>
           </a:p>
         </p:txBody>
@@ -8785,6 +9017,69 @@
           </a:fontRef>
         </p:style>
       </p:cxnSp>
+      <p:graphicFrame>
+        <p:nvGraphicFramePr>
+          <p:cNvPr id="29" name="Table 28">
+            <a:extLst>
+              <a:ext uri="{FF2B5EF4-FFF2-40B4-BE49-F238E27FC236}">
+                <a16:creationId xmlns:a16="http://schemas.microsoft.com/office/drawing/2014/main" id="{AF9848E3-F8F0-4879-AC62-7C82EC0F3744}"/>
+              </a:ext>
+            </a:extLst>
+          </p:cNvPr>
+          <p:cNvGraphicFramePr>
+            <a:graphicFrameLocks noGrp="1"/>
+          </p:cNvGraphicFramePr>
+          <p:nvPr>
+            <p:extLst>
+              <p:ext uri="{D42A27DB-BD31-4B8C-83A1-F6EECF244321}">
+                <p14:modId xmlns:p14="http://schemas.microsoft.com/office/powerpoint/2010/main" val="3467790865"/>
+              </p:ext>
+            </p:extLst>
+          </p:nvPr>
+        </p:nvGraphicFramePr>
+        <p:xfrm>
+          <a:off x="8562977" y="2352032"/>
+          <a:ext cx="1825824" cy="417888"/>
+        </p:xfrm>
+        <a:graphic>
+          <a:graphicData uri="http://schemas.openxmlformats.org/drawingml/2006/table">
+            <a:tbl>
+              <a:tblPr>
+                <a:tableStyleId>{638B1855-1B75-4FBE-930C-398BA8C253C6}</a:tableStyleId>
+              </a:tblPr>
+              <a:tblGrid>
+                <a:gridCol w="1825824">
+                  <a:extLst>
+                    <a:ext uri="{9D8B030D-6E8A-4147-A177-3AD203B41FA5}">
+                      <a16:colId xmlns:a16="http://schemas.microsoft.com/office/drawing/2014/main" val="4240773277"/>
+                    </a:ext>
+                  </a:extLst>
+                </a:gridCol>
+              </a:tblGrid>
+              <a:tr h="417888">
+                <a:tc>
+                  <a:txBody>
+                    <a:bodyPr/>
+                    <a:lstStyle/>
+                    <a:p>
+                      <a:r>
+                        <a:rPr lang="en-SG" u="sng" dirty="0"/>
+                        <a:t>p3:Project</a:t>
+                      </a:r>
+                    </a:p>
+                  </a:txBody>
+                  <a:tcPr/>
+                </a:tc>
+                <a:extLst>
+                  <a:ext uri="{0D108BD9-81ED-4DB2-BD59-A6C34878D82A}">
+                    <a16:rowId xmlns:a16="http://schemas.microsoft.com/office/drawing/2014/main" val="2194462629"/>
+                  </a:ext>
+                </a:extLst>
+              </a:tr>
+            </a:tbl>
+          </a:graphicData>
+        </a:graphic>
+      </p:graphicFrame>
     </p:spTree>
     <p:extLst>
       <p:ext uri="{BB962C8B-B14F-4D97-AF65-F5344CB8AC3E}">

</xml_diff>

<commit_message>
updated PPP & UG & DG Diagram
</commit_message>
<xml_diff>
--- a/docs/diagrams/UndoRedoExecuteUndoStateListDiagram.pptx
+++ b/docs/diagrams/UndoRedoExecuteUndoStateListDiagram.pptx
@@ -277,7 +277,7 @@
           <a:p>
             <a:fld id="{03EC4E3E-8101-482F-A883-8B55DAFF7C07}" type="datetimeFigureOut">
               <a:rPr lang="en-SG" smtClean="0"/>
-              <a:t>5/4/2019</a:t>
+              <a:t>7/4/2019</a:t>
             </a:fld>
             <a:endParaRPr lang="en-SG"/>
           </a:p>
@@ -477,7 +477,7 @@
           <a:p>
             <a:fld id="{03EC4E3E-8101-482F-A883-8B55DAFF7C07}" type="datetimeFigureOut">
               <a:rPr lang="en-SG" smtClean="0"/>
-              <a:t>5/4/2019</a:t>
+              <a:t>7/4/2019</a:t>
             </a:fld>
             <a:endParaRPr lang="en-SG"/>
           </a:p>
@@ -687,7 +687,7 @@
           <a:p>
             <a:fld id="{03EC4E3E-8101-482F-A883-8B55DAFF7C07}" type="datetimeFigureOut">
               <a:rPr lang="en-SG" smtClean="0"/>
-              <a:t>5/4/2019</a:t>
+              <a:t>7/4/2019</a:t>
             </a:fld>
             <a:endParaRPr lang="en-SG"/>
           </a:p>
@@ -887,7 +887,7 @@
           <a:p>
             <a:fld id="{03EC4E3E-8101-482F-A883-8B55DAFF7C07}" type="datetimeFigureOut">
               <a:rPr lang="en-SG" smtClean="0"/>
-              <a:t>5/4/2019</a:t>
+              <a:t>7/4/2019</a:t>
             </a:fld>
             <a:endParaRPr lang="en-SG"/>
           </a:p>
@@ -1163,7 +1163,7 @@
           <a:p>
             <a:fld id="{03EC4E3E-8101-482F-A883-8B55DAFF7C07}" type="datetimeFigureOut">
               <a:rPr lang="en-SG" smtClean="0"/>
-              <a:t>5/4/2019</a:t>
+              <a:t>7/4/2019</a:t>
             </a:fld>
             <a:endParaRPr lang="en-SG"/>
           </a:p>
@@ -1431,7 +1431,7 @@
           <a:p>
             <a:fld id="{03EC4E3E-8101-482F-A883-8B55DAFF7C07}" type="datetimeFigureOut">
               <a:rPr lang="en-SG" smtClean="0"/>
-              <a:t>5/4/2019</a:t>
+              <a:t>7/4/2019</a:t>
             </a:fld>
             <a:endParaRPr lang="en-SG"/>
           </a:p>
@@ -1846,7 +1846,7 @@
           <a:p>
             <a:fld id="{03EC4E3E-8101-482F-A883-8B55DAFF7C07}" type="datetimeFigureOut">
               <a:rPr lang="en-SG" smtClean="0"/>
-              <a:t>5/4/2019</a:t>
+              <a:t>7/4/2019</a:t>
             </a:fld>
             <a:endParaRPr lang="en-SG"/>
           </a:p>
@@ -1988,7 +1988,7 @@
           <a:p>
             <a:fld id="{03EC4E3E-8101-482F-A883-8B55DAFF7C07}" type="datetimeFigureOut">
               <a:rPr lang="en-SG" smtClean="0"/>
-              <a:t>5/4/2019</a:t>
+              <a:t>7/4/2019</a:t>
             </a:fld>
             <a:endParaRPr lang="en-SG"/>
           </a:p>
@@ -2101,7 +2101,7 @@
           <a:p>
             <a:fld id="{03EC4E3E-8101-482F-A883-8B55DAFF7C07}" type="datetimeFigureOut">
               <a:rPr lang="en-SG" smtClean="0"/>
-              <a:t>5/4/2019</a:t>
+              <a:t>7/4/2019</a:t>
             </a:fld>
             <a:endParaRPr lang="en-SG"/>
           </a:p>
@@ -2414,7 +2414,7 @@
           <a:p>
             <a:fld id="{03EC4E3E-8101-482F-A883-8B55DAFF7C07}" type="datetimeFigureOut">
               <a:rPr lang="en-SG" smtClean="0"/>
-              <a:t>5/4/2019</a:t>
+              <a:t>7/4/2019</a:t>
             </a:fld>
             <a:endParaRPr lang="en-SG"/>
           </a:p>
@@ -2703,7 +2703,7 @@
           <a:p>
             <a:fld id="{03EC4E3E-8101-482F-A883-8B55DAFF7C07}" type="datetimeFigureOut">
               <a:rPr lang="en-SG" smtClean="0"/>
-              <a:t>5/4/2019</a:t>
+              <a:t>7/4/2019</a:t>
             </a:fld>
             <a:endParaRPr lang="en-SG"/>
           </a:p>
@@ -2946,7 +2946,7 @@
           <a:p>
             <a:fld id="{03EC4E3E-8101-482F-A883-8B55DAFF7C07}" type="datetimeFigureOut">
               <a:rPr lang="en-SG" smtClean="0"/>
-              <a:t>5/4/2019</a:t>
+              <a:t>7/4/2019</a:t>
             </a:fld>
             <a:endParaRPr lang="en-SG"/>
           </a:p>
@@ -8612,7 +8612,7 @@
                 </a:solidFill>
                 <a:latin typeface="Consolas" panose="020B0609020204030204" pitchFamily="49" charset="0"/>
               </a:rPr>
-              <a:t>1. Find the task with the same </a:t>
+              <a:t>A. Find the task with the same </a:t>
             </a:r>
             <a:r>
               <a:rPr lang="en-SG" dirty="0" err="1">
@@ -8668,7 +8668,7 @@
                 </a:solidFill>
                 <a:latin typeface="Consolas" panose="020B0609020204030204" pitchFamily="49" charset="0"/>
               </a:rPr>
-              <a:t>3. Iterate through all project versions</a:t>
+              <a:t>C. Iterate through all project versions</a:t>
             </a:r>
           </a:p>
         </p:txBody>
@@ -8714,7 +8714,7 @@
                 </a:solidFill>
                 <a:latin typeface="Consolas" panose="020B0609020204030204" pitchFamily="49" charset="0"/>
               </a:rPr>
-              <a:t>2. Check if there is any difference in the fields</a:t>
+              <a:t>B. Check if there is any difference in the fields</a:t>
             </a:r>
           </a:p>
         </p:txBody>

</xml_diff>